<commit_message>
Refine PowerPoint: unified fonts and headings
</commit_message>
<xml_diff>
--- a/Power_Point/Power_Point_Presentation.pptx
+++ b/Power_Point/Power_Point_Presentation.pptx
@@ -136,7 +136,7 @@
 <file path=ppt/revisionInfo.xml><?xml version="1.0" encoding="utf-8"?>
 <p1510:revInfo xmlns:a="http://schemas.openxmlformats.org/drawingml/2006/main" xmlns:r="http://schemas.openxmlformats.org/officeDocument/2006/relationships" xmlns:p1510="http://schemas.microsoft.com/office/powerpoint/2015/10/main">
   <p1510:revLst>
-    <p1510:client id="{26FE7107-B7AE-45EB-A2E5-DD1171076D7E}" v="513" dt="2025-05-08T14:36:01.951"/>
+    <p1510:client id="{6F807693-CA9B-4361-ACB0-AA436FA20C0C}" v="126" dt="2025-05-23T15:30:00.259"/>
   </p1510:revLst>
 </p1510:revInfo>
 </file>
@@ -320,7 +320,7 @@
           <a:p>
             <a:fld id="{5BCAD085-E8A6-8845-BD4E-CB4CCA059FC4}" type="datetimeFigureOut">
               <a:rPr lang="en-US" smtClean="0"/>
-              <a:t>5/8/2025</a:t>
+              <a:t>5/23/2025</a:t>
             </a:fld>
             <a:endParaRPr lang="en-US"/>
           </a:p>
@@ -488,7 +488,7 @@
           <a:p>
             <a:fld id="{5BCAD085-E8A6-8845-BD4E-CB4CCA059FC4}" type="datetimeFigureOut">
               <a:rPr lang="en-US" smtClean="0"/>
-              <a:t>5/8/2025</a:t>
+              <a:t>5/23/2025</a:t>
             </a:fld>
             <a:endParaRPr lang="en-US"/>
           </a:p>
@@ -666,7 +666,7 @@
           <a:p>
             <a:fld id="{5BCAD085-E8A6-8845-BD4E-CB4CCA059FC4}" type="datetimeFigureOut">
               <a:rPr lang="en-US" smtClean="0"/>
-              <a:t>5/8/2025</a:t>
+              <a:t>5/23/2025</a:t>
             </a:fld>
             <a:endParaRPr lang="en-US"/>
           </a:p>
@@ -834,7 +834,7 @@
           <a:p>
             <a:fld id="{5BCAD085-E8A6-8845-BD4E-CB4CCA059FC4}" type="datetimeFigureOut">
               <a:rPr lang="en-US" smtClean="0"/>
-              <a:t>5/8/2025</a:t>
+              <a:t>5/23/2025</a:t>
             </a:fld>
             <a:endParaRPr lang="en-US"/>
           </a:p>
@@ -1079,7 +1079,7 @@
           <a:p>
             <a:fld id="{5BCAD085-E8A6-8845-BD4E-CB4CCA059FC4}" type="datetimeFigureOut">
               <a:rPr lang="en-US" smtClean="0"/>
-              <a:t>5/8/2025</a:t>
+              <a:t>5/23/2025</a:t>
             </a:fld>
             <a:endParaRPr lang="en-US"/>
           </a:p>
@@ -1364,7 +1364,7 @@
           <a:p>
             <a:fld id="{5BCAD085-E8A6-8845-BD4E-CB4CCA059FC4}" type="datetimeFigureOut">
               <a:rPr lang="en-US" smtClean="0"/>
-              <a:t>5/8/2025</a:t>
+              <a:t>5/23/2025</a:t>
             </a:fld>
             <a:endParaRPr lang="en-US"/>
           </a:p>
@@ -1783,7 +1783,7 @@
           <a:p>
             <a:fld id="{5BCAD085-E8A6-8845-BD4E-CB4CCA059FC4}" type="datetimeFigureOut">
               <a:rPr lang="en-US" smtClean="0"/>
-              <a:t>5/8/2025</a:t>
+              <a:t>5/23/2025</a:t>
             </a:fld>
             <a:endParaRPr lang="en-US"/>
           </a:p>
@@ -1900,7 +1900,7 @@
           <a:p>
             <a:fld id="{5BCAD085-E8A6-8845-BD4E-CB4CCA059FC4}" type="datetimeFigureOut">
               <a:rPr lang="en-US" smtClean="0"/>
-              <a:t>5/8/2025</a:t>
+              <a:t>5/23/2025</a:t>
             </a:fld>
             <a:endParaRPr lang="en-US"/>
           </a:p>
@@ -1995,7 +1995,7 @@
           <a:p>
             <a:fld id="{5BCAD085-E8A6-8845-BD4E-CB4CCA059FC4}" type="datetimeFigureOut">
               <a:rPr lang="en-US" smtClean="0"/>
-              <a:t>5/8/2025</a:t>
+              <a:t>5/23/2025</a:t>
             </a:fld>
             <a:endParaRPr lang="en-US"/>
           </a:p>
@@ -2270,7 +2270,7 @@
           <a:p>
             <a:fld id="{5BCAD085-E8A6-8845-BD4E-CB4CCA059FC4}" type="datetimeFigureOut">
               <a:rPr lang="en-US" smtClean="0"/>
-              <a:t>5/8/2025</a:t>
+              <a:t>5/23/2025</a:t>
             </a:fld>
             <a:endParaRPr lang="en-US"/>
           </a:p>
@@ -2522,7 +2522,7 @@
           <a:p>
             <a:fld id="{5BCAD085-E8A6-8845-BD4E-CB4CCA059FC4}" type="datetimeFigureOut">
               <a:rPr lang="en-US" smtClean="0"/>
-              <a:t>5/8/2025</a:t>
+              <a:t>5/23/2025</a:t>
             </a:fld>
             <a:endParaRPr lang="en-US"/>
           </a:p>
@@ -2733,7 +2733,7 @@
           <a:p>
             <a:fld id="{5BCAD085-E8A6-8845-BD4E-CB4CCA059FC4}" type="datetimeFigureOut">
               <a:rPr lang="en-US" smtClean="0"/>
-              <a:t>5/8/2025</a:t>
+              <a:t>5/23/2025</a:t>
             </a:fld>
             <a:endParaRPr lang="en-US"/>
           </a:p>
@@ -3118,7 +3118,12 @@
             <p:ph type="ctrTitle"/>
           </p:nvPr>
         </p:nvSpPr>
-        <p:spPr/>
+        <p:spPr>
+          <a:xfrm>
+            <a:off x="685800" y="409910"/>
+            <a:ext cx="7772400" cy="1915193"/>
+          </a:xfrm>
+        </p:spPr>
         <p:txBody>
           <a:bodyPr/>
           <a:lstStyle/>
@@ -3139,44 +3144,108 @@
             <p:ph type="subTitle" idx="1"/>
           </p:nvPr>
         </p:nvSpPr>
-        <p:spPr/>
+        <p:spPr>
+          <a:xfrm>
+            <a:off x="1371600" y="2658979"/>
+            <a:ext cx="6400800" cy="2979821"/>
+          </a:xfrm>
+        </p:spPr>
         <p:txBody>
           <a:bodyPr vert="horz" lIns="91440" tIns="45720" rIns="91440" bIns="45720" rtlCol="0" anchor="t">
-            <a:normAutofit fontScale="85000" lnSpcReduction="20000"/>
+            <a:normAutofit/>
           </a:bodyPr>
           <a:lstStyle/>
           <a:p>
             <a:r>
-              <a:rPr err="1"/>
+              <a:rPr sz="2700" err="1">
+                <a:solidFill>
+                  <a:schemeClr val="tx1"/>
+                </a:solidFill>
+              </a:rPr>
               <a:t>Nwokike</a:t>
             </a:r>
             <a:r>
-              <a:rPr dirty="0"/>
-              <a:t> Chiagozie Precious</a:t>
-            </a:r>
-          </a:p>
-          <a:p>
-            <a:r>
-              <a:rPr dirty="0"/>
+              <a:rPr sz="2700" dirty="0">
+                <a:solidFill>
+                  <a:schemeClr val="tx1"/>
+                </a:solidFill>
+              </a:rPr>
+              <a:t> Chiagozie </a:t>
+            </a:r>
+            <a:r>
+              <a:rPr lang="en-GB" sz="2700" dirty="0">
+                <a:solidFill>
+                  <a:schemeClr val="tx1"/>
+                </a:solidFill>
+              </a:rPr>
+              <a:t>Precious</a:t>
+            </a:r>
+            <a:endParaRPr lang="en-US" sz="2700">
+              <a:solidFill>
+                <a:schemeClr val="tx1"/>
+              </a:solidFill>
+              <a:ea typeface="Calibri"/>
+              <a:cs typeface="Calibri"/>
+            </a:endParaRPr>
+          </a:p>
+          <a:p>
+            <a:r>
+              <a:rPr sz="2700" dirty="0">
+                <a:solidFill>
+                  <a:schemeClr val="tx1"/>
+                </a:solidFill>
+              </a:rPr>
               <a:t>chiagozienwokike@gmail.com</a:t>
             </a:r>
-          </a:p>
-          <a:p>
-            <a:r>
-              <a:rPr dirty="0"/>
+            <a:endParaRPr sz="2700">
+              <a:solidFill>
+                <a:schemeClr val="tx1"/>
+              </a:solidFill>
+              <a:ea typeface="Calibri"/>
+              <a:cs typeface="Calibri"/>
+            </a:endParaRPr>
+          </a:p>
+          <a:p>
+            <a:r>
+              <a:rPr sz="2700" dirty="0">
+                <a:solidFill>
+                  <a:schemeClr val="tx1"/>
+                </a:solidFill>
+              </a:rPr>
               <a:t>Date: </a:t>
             </a:r>
             <a:r>
-              <a:rPr lang="en-GB" dirty="0"/>
+              <a:rPr lang="en-GB" sz="2700" dirty="0">
+                <a:solidFill>
+                  <a:schemeClr val="tx1"/>
+                </a:solidFill>
+              </a:rPr>
               <a:t>07-05-2025</a:t>
             </a:r>
-            <a:endParaRPr/>
-          </a:p>
-          <a:p>
-            <a:r>
-              <a:rPr dirty="0"/>
+            <a:endParaRPr sz="2700">
+              <a:solidFill>
+                <a:schemeClr val="tx1"/>
+              </a:solidFill>
+              <a:ea typeface="Calibri"/>
+              <a:cs typeface="Calibri"/>
+            </a:endParaRPr>
+          </a:p>
+          <a:p>
+            <a:r>
+              <a:rPr sz="2700" dirty="0">
+                <a:solidFill>
+                  <a:schemeClr val="tx1"/>
+                </a:solidFill>
+              </a:rPr>
               <a:t>Tool Stack: SQL, Python, Power BI</a:t>
             </a:r>
+            <a:endParaRPr sz="2700" dirty="0">
+              <a:solidFill>
+                <a:schemeClr val="tx1"/>
+              </a:solidFill>
+              <a:ea typeface="Calibri"/>
+              <a:cs typeface="Calibri"/>
+            </a:endParaRPr>
           </a:p>
         </p:txBody>
       </p:sp>
@@ -3497,37 +3566,66 @@
             <p:ph idx="1"/>
           </p:nvPr>
         </p:nvSpPr>
-        <p:spPr/>
-        <p:txBody>
-          <a:bodyPr/>
-          <a:lstStyle/>
-          <a:p>
-            <a:r>
+        <p:spPr>
+          <a:xfrm>
+            <a:off x="457200" y="1600199"/>
+            <a:ext cx="8229600" cy="5007227"/>
+          </a:xfrm>
+        </p:spPr>
+        <p:txBody>
+          <a:bodyPr vert="horz" lIns="91440" tIns="45720" rIns="91440" bIns="45720" rtlCol="0" anchor="t">
+            <a:normAutofit/>
+          </a:bodyPr>
+          <a:lstStyle/>
+          <a:p>
+            <a:r>
+              <a:rPr sz="2700" dirty="0"/>
               <a:t>Objective: Analyze music sales data from the Chinook database to uncover sales trends, customer behavior, and lifetime value.</a:t>
             </a:r>
-          </a:p>
-          <a:p>
-            <a:endParaRPr/>
-          </a:p>
-          <a:p>
-            <a:r>
+            <a:endParaRPr lang="en-US" sz="2700">
+              <a:ea typeface="Calibri"/>
+              <a:cs typeface="Calibri"/>
+            </a:endParaRPr>
+          </a:p>
+          <a:p>
+            <a:r>
+              <a:rPr sz="2700" dirty="0"/>
               <a:t>Tools Used:</a:t>
             </a:r>
-          </a:p>
-          <a:p>
-            <a:r>
+            <a:endParaRPr sz="2700">
+              <a:ea typeface="Calibri"/>
+              <a:cs typeface="Calibri"/>
+            </a:endParaRPr>
+          </a:p>
+          <a:p>
+            <a:r>
+              <a:rPr sz="2700" dirty="0"/>
               <a:t>- SQL: For querying and extracting insights.</a:t>
             </a:r>
-          </a:p>
-          <a:p>
-            <a:r>
+            <a:endParaRPr sz="2700">
+              <a:ea typeface="Calibri"/>
+              <a:cs typeface="Calibri"/>
+            </a:endParaRPr>
+          </a:p>
+          <a:p>
+            <a:r>
+              <a:rPr sz="2700" dirty="0"/>
               <a:t>- Python: For business and predictive analysis (CLTV modeling).</a:t>
             </a:r>
-          </a:p>
-          <a:p>
-            <a:r>
+            <a:endParaRPr sz="2700">
+              <a:ea typeface="Calibri"/>
+              <a:cs typeface="Calibri"/>
+            </a:endParaRPr>
+          </a:p>
+          <a:p>
+            <a:r>
+              <a:rPr sz="2700" dirty="0"/>
               <a:t>- Power BI: For interactive dashboard visualizations.</a:t>
             </a:r>
+            <a:endParaRPr sz="2700" dirty="0">
+              <a:ea typeface="Calibri"/>
+              <a:cs typeface="Calibri"/>
+            </a:endParaRPr>
           </a:p>
         </p:txBody>
       </p:sp>
@@ -3595,45 +3693,53 @@
           <a:lstStyle/>
           <a:p>
             <a:r>
-              <a:rPr dirty="0"/>
+              <a:rPr sz="2700" dirty="0"/>
               <a:t>Who are the top-selling artists and how do their sales vary over time?</a:t>
             </a:r>
-          </a:p>
-          <a:p>
-            <a:r>
-              <a:rPr dirty="0"/>
-              <a:t>What customer segments exist based on purchase behavior?</a:t>
-            </a:r>
-            <a:endParaRPr dirty="0">
+            <a:endParaRPr lang="en-US" sz="2700" dirty="0">
               <a:ea typeface="Calibri"/>
               <a:cs typeface="Calibri"/>
             </a:endParaRPr>
           </a:p>
           <a:p>
             <a:r>
-              <a:rPr dirty="0"/>
-              <a:t>Which genres are most popular?</a:t>
-            </a:r>
-            <a:endParaRPr dirty="0">
+              <a:rPr sz="2700" dirty="0"/>
+              <a:t>What customer segments exist based on purchase behavior?</a:t>
+            </a:r>
+            <a:endParaRPr sz="2700">
               <a:ea typeface="Calibri"/>
               <a:cs typeface="Calibri"/>
             </a:endParaRPr>
           </a:p>
           <a:p>
             <a:r>
-              <a:rPr dirty="0"/>
-              <a:t>How can we predict customer lifetime value?</a:t>
-            </a:r>
-            <a:endParaRPr dirty="0">
+              <a:rPr sz="2700" dirty="0"/>
+              <a:t>Which genres are most popular?</a:t>
+            </a:r>
+            <a:endParaRPr sz="2700">
               <a:ea typeface="Calibri"/>
               <a:cs typeface="Calibri"/>
             </a:endParaRPr>
           </a:p>
           <a:p>
             <a:r>
-              <a:rPr dirty="0"/>
+              <a:rPr sz="2700" dirty="0"/>
+              <a:t>How can we predict customer lifetime value?</a:t>
+            </a:r>
+            <a:endParaRPr sz="2700">
+              <a:ea typeface="Calibri"/>
+              <a:cs typeface="Calibri"/>
+            </a:endParaRPr>
+          </a:p>
+          <a:p>
+            <a:r>
+              <a:rPr sz="2700" dirty="0"/>
               <a:t>Are there patterns in product purchases?</a:t>
             </a:r>
+            <a:endParaRPr sz="2700" dirty="0">
+              <a:ea typeface="Calibri"/>
+              <a:cs typeface="Calibri"/>
+            </a:endParaRPr>
           </a:p>
         </p:txBody>
       </p:sp>
@@ -3699,60 +3805,14 @@
         </p:blipFill>
         <p:spPr>
           <a:xfrm>
-            <a:off x="1480159" y="2663033"/>
-            <a:ext cx="6194066" cy="3474720"/>
+            <a:off x="120591" y="1712538"/>
+            <a:ext cx="8853044" cy="5111015"/>
           </a:xfrm>
           <a:prstGeom prst="rect">
             <a:avLst/>
           </a:prstGeom>
         </p:spPr>
       </p:pic>
-      <p:sp>
-        <p:nvSpPr>
-          <p:cNvPr id="4" name="TextBox 3"/>
-          <p:cNvSpPr txBox="1"/>
-          <p:nvPr/>
-        </p:nvSpPr>
-        <p:spPr>
-          <a:xfrm>
-            <a:off x="5029200" y="1097280"/>
-            <a:ext cx="3657600" cy="3474720"/>
-          </a:xfrm>
-          <a:prstGeom prst="rect">
-            <a:avLst/>
-          </a:prstGeom>
-          <a:noFill/>
-        </p:spPr>
-        <p:txBody>
-          <a:bodyPr wrap="square">
-            <a:spAutoFit/>
-          </a:bodyPr>
-          <a:lstStyle/>
-          <a:p>
-            <a:endParaRPr/>
-          </a:p>
-          <a:p>
-            <a:pPr>
-              <a:defRPr sz="1400">
-                <a:solidFill>
-                  <a:srgbClr val="000000"/>
-                </a:solidFill>
-              </a:defRPr>
-            </a:pPr>
-            <a:r>
-              <a:t>- Iron Maiden tops artist sales.</a:t>
-            </a:r>
-            <a:br/>
-            <a:r>
-              <a:t>- Clear segmentation of customer types (VIP, Loyal, Churned).</a:t>
-            </a:r>
-            <a:br/>
-            <a:r>
-              <a:t>- High-value customers mapped globally.</a:t>
-            </a:r>
-          </a:p>
-        </p:txBody>
-      </p:sp>
     </p:spTree>
   </p:cSld>
   <p:clrMapOvr>
@@ -3815,60 +3875,14 @@
         </p:blipFill>
         <p:spPr>
           <a:xfrm>
-            <a:off x="1686179" y="2670725"/>
-            <a:ext cx="6062823" cy="3474720"/>
+            <a:off x="194264" y="1708199"/>
+            <a:ext cx="8769927" cy="5147108"/>
           </a:xfrm>
           <a:prstGeom prst="rect">
             <a:avLst/>
           </a:prstGeom>
         </p:spPr>
       </p:pic>
-      <p:sp>
-        <p:nvSpPr>
-          <p:cNvPr id="4" name="TextBox 3"/>
-          <p:cNvSpPr txBox="1"/>
-          <p:nvPr/>
-        </p:nvSpPr>
-        <p:spPr>
-          <a:xfrm>
-            <a:off x="5029200" y="1097280"/>
-            <a:ext cx="3657600" cy="3474720"/>
-          </a:xfrm>
-          <a:prstGeom prst="rect">
-            <a:avLst/>
-          </a:prstGeom>
-          <a:noFill/>
-        </p:spPr>
-        <p:txBody>
-          <a:bodyPr wrap="square">
-            <a:spAutoFit/>
-          </a:bodyPr>
-          <a:lstStyle/>
-          <a:p>
-            <a:endParaRPr/>
-          </a:p>
-          <a:p>
-            <a:pPr>
-              <a:defRPr sz="1400">
-                <a:solidFill>
-                  <a:srgbClr val="000000"/>
-                </a:solidFill>
-              </a:defRPr>
-            </a:pPr>
-            <a:r>
-              <a:t>- Rock dominates genre sales.</a:t>
-            </a:r>
-            <a:br/>
-            <a:r>
-              <a:t>- Seasonal trends suggest peak sales periods.</a:t>
-            </a:r>
-            <a:br/>
-            <a:r>
-              <a:t>- Genre popularity shifts over time.</a:t>
-            </a:r>
-          </a:p>
-        </p:txBody>
-      </p:sp>
     </p:spTree>
   </p:cSld>
   <p:clrMapOvr>
@@ -3931,79 +3945,14 @@
         </p:blipFill>
         <p:spPr>
           <a:xfrm>
-            <a:off x="1350009" y="2841859"/>
-            <a:ext cx="6159967" cy="3474720"/>
+            <a:off x="2473" y="1566512"/>
+            <a:ext cx="9143797" cy="5279455"/>
           </a:xfrm>
           <a:prstGeom prst="rect">
             <a:avLst/>
           </a:prstGeom>
         </p:spPr>
       </p:pic>
-      <p:sp>
-        <p:nvSpPr>
-          <p:cNvPr id="4" name="TextBox 3"/>
-          <p:cNvSpPr txBox="1"/>
-          <p:nvPr/>
-        </p:nvSpPr>
-        <p:spPr>
-          <a:xfrm>
-            <a:off x="5029200" y="1097280"/>
-            <a:ext cx="3657600" cy="1661993"/>
-          </a:xfrm>
-          <a:prstGeom prst="rect">
-            <a:avLst/>
-          </a:prstGeom>
-          <a:noFill/>
-        </p:spPr>
-        <p:txBody>
-          <a:bodyPr wrap="square" lIns="91440" tIns="45720" rIns="91440" bIns="45720" anchor="t">
-            <a:spAutoFit/>
-          </a:bodyPr>
-          <a:lstStyle/>
-          <a:p>
-            <a:endParaRPr/>
-          </a:p>
-          <a:p>
-            <a:pPr>
-              <a:defRPr sz="1400">
-                <a:solidFill>
-                  <a:srgbClr val="000000"/>
-                </a:solidFill>
-              </a:defRPr>
-            </a:pPr>
-            <a:r>
-              <a:rPr dirty="0"/>
-              <a:t>- CLTV segments show most value in "Regular" and </a:t>
-            </a:r>
-            <a:r>
-              <a:rPr lang="en-GB" dirty="0"/>
-              <a:t>"Loyal"</a:t>
-            </a:r>
-            <a:r>
-              <a:rPr dirty="0"/>
-              <a:t> customers.</a:t>
-            </a:r>
-            <a:br>
-              <a:rPr dirty="0"/>
-            </a:br>
-            <a:r>
-              <a:rPr dirty="0"/>
-              <a:t>- Market Basket Analysis reveals commonly paired albums.</a:t>
-            </a:r>
-            <a:br>
-              <a:rPr dirty="0"/>
-            </a:br>
-            <a:r>
-              <a:rPr dirty="0"/>
-              <a:t>- Retention strategies can target high CLTV segments.</a:t>
-            </a:r>
-            <a:endParaRPr dirty="0">
-              <a:ea typeface="Calibri"/>
-              <a:cs typeface="Calibri"/>
-            </a:endParaRPr>
-          </a:p>
-        </p:txBody>
-      </p:sp>
     </p:spTree>
   </p:cSld>
   <p:clrMapOvr>
@@ -4047,37 +3996,33 @@
         </p:nvSpPr>
         <p:spPr>
           <a:xfrm>
-            <a:off x="457200" y="587788"/>
-            <a:ext cx="8229600" cy="829850"/>
+            <a:off x="457200" y="1237493"/>
+            <a:ext cx="8229600" cy="721566"/>
           </a:xfrm>
         </p:spPr>
         <p:txBody>
-          <a:bodyPr>
-            <a:normAutofit fontScale="90000"/>
+          <a:bodyPr vert="horz" lIns="91440" tIns="45720" rIns="91440" bIns="45720" rtlCol="0" anchor="ctr">
+            <a:noAutofit/>
           </a:bodyPr>
           <a:lstStyle/>
           <a:p>
             <a:r>
-              <a:rPr lang="en-GB" sz="3200" dirty="0">
+              <a:rPr lang="en-GB" dirty="0">
                 <a:ea typeface="+mj-lt"/>
                 <a:cs typeface="+mj-lt"/>
               </a:rPr>
               <a:t>Machine Learning Objective and Approach</a:t>
             </a:r>
-            <a:endParaRPr lang="en-US" sz="3200" dirty="0">
+            <a:endParaRPr lang="en-US">
               <a:ea typeface="Calibri"/>
               <a:cs typeface="Calibri"/>
             </a:endParaRPr>
           </a:p>
           <a:p>
-            <a:r>
-              <a:rPr lang="en-GB" sz="2800" dirty="0">
-                <a:ea typeface="+mj-lt"/>
-                <a:cs typeface="+mj-lt"/>
-              </a:rPr>
-              <a:t>Predicting Customer Lifetime Value with Machine Learning</a:t>
-            </a:r>
-            <a:endParaRPr lang="en-GB" sz="2800" dirty="0"/>
+            <a:endParaRPr lang="en-GB">
+              <a:ea typeface="Calibri"/>
+              <a:cs typeface="Calibri"/>
+            </a:endParaRPr>
           </a:p>
           <a:p>
             <a:endParaRPr lang="en-GB" dirty="0">
@@ -4103,10 +4048,15 @@
             <p:ph idx="1"/>
           </p:nvPr>
         </p:nvSpPr>
-        <p:spPr/>
+        <p:spPr>
+          <a:xfrm>
+            <a:off x="457200" y="1949116"/>
+            <a:ext cx="8229600" cy="4910973"/>
+          </a:xfrm>
+        </p:spPr>
         <p:txBody>
           <a:bodyPr vert="horz" lIns="91440" tIns="45720" rIns="91440" bIns="45720" rtlCol="0" anchor="t">
-            <a:normAutofit fontScale="85000" lnSpcReduction="20000"/>
+            <a:noAutofit/>
           </a:bodyPr>
           <a:lstStyle/>
           <a:p>
@@ -4114,66 +4064,66 @@
               <a:buNone/>
             </a:pPr>
             <a:r>
-              <a:rPr lang="en-GB" dirty="0">
+              <a:rPr lang="en-GB" sz="2600" dirty="0">
                 <a:ea typeface="+mn-lt"/>
                 <a:cs typeface="+mn-lt"/>
               </a:rPr>
-              <a:t>• Objective: Predict customer lifetime value (CLV) to identify high-value customers and inform targeted marketing strategies for the Chinook Media Store.</a:t>
+              <a:t>• Objective: Predict customer lifetime value (CLV) to   identify high-value customers and inform targeted marketing strategies for the Chinook Media Store.</a:t>
             </a:r>
             <a:br>
-              <a:rPr lang="en-GB" dirty="0">
+              <a:rPr lang="en-GB" sz="2600" dirty="0">
                 <a:ea typeface="+mn-lt"/>
                 <a:cs typeface="+mn-lt"/>
               </a:rPr>
             </a:br>
             <a:r>
-              <a:rPr lang="en-GB" dirty="0">
+              <a:rPr lang="en-GB" sz="2600" dirty="0">
                 <a:ea typeface="+mn-lt"/>
                 <a:cs typeface="+mn-lt"/>
               </a:rPr>
               <a:t>• Data Source: Extracted features from Chinook database tables, including total spend, purchase frequency, genre preferences, etc.</a:t>
             </a:r>
             <a:br>
-              <a:rPr lang="en-GB" dirty="0">
+              <a:rPr lang="en-GB" sz="2600" dirty="0">
                 <a:ea typeface="+mn-lt"/>
                 <a:cs typeface="+mn-lt"/>
               </a:rPr>
             </a:br>
             <a:r>
-              <a:rPr lang="en-GB" dirty="0">
+              <a:rPr lang="en-GB" sz="2600" dirty="0">
                 <a:ea typeface="+mn-lt"/>
                 <a:cs typeface="+mn-lt"/>
               </a:rPr>
               <a:t>• Approach: Developed machine learning models in </a:t>
             </a:r>
             <a:r>
-              <a:rPr lang="en-GB" dirty="0" err="1">
+              <a:rPr lang="en-GB" sz="2600" dirty="0" err="1">
                 <a:ea typeface="+mn-lt"/>
                 <a:cs typeface="+mn-lt"/>
               </a:rPr>
               <a:t>Jupyter</a:t>
             </a:r>
             <a:r>
-              <a:rPr lang="en-GB" dirty="0">
+              <a:rPr lang="en-GB" sz="2600" dirty="0">
                 <a:ea typeface="+mn-lt"/>
                 <a:cs typeface="+mn-lt"/>
               </a:rPr>
               <a:t> Notebook using Python to predict CLV based on historical customer purchase data.</a:t>
             </a:r>
             <a:br>
-              <a:rPr lang="en-GB" dirty="0">
+              <a:rPr lang="en-GB" sz="2600" dirty="0">
                 <a:ea typeface="+mn-lt"/>
                 <a:cs typeface="+mn-lt"/>
               </a:rPr>
             </a:br>
             <a:r>
-              <a:rPr lang="en-GB" dirty="0">
+              <a:rPr lang="en-GB" sz="2600" dirty="0">
                 <a:ea typeface="+mn-lt"/>
                 <a:cs typeface="+mn-lt"/>
               </a:rPr>
               <a:t>• Models Evaluated: Linear regression, random forest, and gradient boosting, selected for their ability to model customer behaviour patterns. </a:t>
             </a:r>
-            <a:endParaRPr lang="en-GB" dirty="0">
+            <a:endParaRPr lang="en-GB" sz="2600" dirty="0">
               <a:ea typeface="Calibri"/>
               <a:cs typeface="Calibri"/>
             </a:endParaRPr>
@@ -4234,8 +4184,8 @@
         </p:nvSpPr>
         <p:spPr>
           <a:xfrm>
-            <a:off x="457200" y="142290"/>
-            <a:ext cx="8229600" cy="1275348"/>
+            <a:off x="457200" y="876217"/>
+            <a:ext cx="8229600" cy="1130968"/>
           </a:xfrm>
         </p:spPr>
         <p:txBody>
@@ -4245,23 +4195,16 @@
           <a:lstStyle/>
           <a:p>
             <a:r>
-              <a:rPr lang="en-GB" sz="3200">
+              <a:rPr lang="en-GB" dirty="0">
                 <a:ea typeface="+mj-lt"/>
                 <a:cs typeface="+mj-lt"/>
               </a:rPr>
               <a:t>Model Development and Results</a:t>
             </a:r>
-            <a:endParaRPr lang="en-US" sz="3200"/>
-          </a:p>
-          <a:p>
-            <a:r>
-              <a:rPr lang="en-GB" sz="2800" dirty="0">
-                <a:ea typeface="+mj-lt"/>
-                <a:cs typeface="+mj-lt"/>
-              </a:rPr>
-              <a:t>Model Performance: Linear Regression Leads</a:t>
-            </a:r>
-            <a:endParaRPr lang="en-GB" sz="2800" dirty="0"/>
+            <a:endParaRPr lang="en-US" dirty="0"/>
+          </a:p>
+          <a:p>
+            <a:endParaRPr lang="en-GB" dirty="0"/>
           </a:p>
           <a:p>
             <a:endParaRPr lang="en-GB" dirty="0">
@@ -4287,10 +4230,15 @@
             <p:ph idx="1"/>
           </p:nvPr>
         </p:nvSpPr>
-        <p:spPr/>
+        <p:spPr>
+          <a:xfrm>
+            <a:off x="300789" y="1684423"/>
+            <a:ext cx="8542421" cy="4790655"/>
+          </a:xfrm>
+        </p:spPr>
         <p:txBody>
           <a:bodyPr vert="horz" lIns="91440" tIns="45720" rIns="91440" bIns="45720" rtlCol="0" anchor="t">
-            <a:normAutofit fontScale="70000" lnSpcReduction="20000"/>
+            <a:normAutofit fontScale="85000" lnSpcReduction="10000"/>
           </a:bodyPr>
           <a:lstStyle/>
           <a:p>
@@ -4298,135 +4246,130 @@
               <a:buNone/>
             </a:pPr>
             <a:r>
-              <a:rPr lang="en-GB" dirty="0">
+              <a:rPr lang="en-GB" sz="2700" dirty="0">
                 <a:ea typeface="+mn-lt"/>
                 <a:cs typeface="+mn-lt"/>
               </a:rPr>
               <a:t>• Model Development: Trained three models in </a:t>
             </a:r>
             <a:r>
-              <a:rPr lang="en-GB" dirty="0" err="1">
+              <a:rPr lang="en-GB" sz="2700" err="1">
                 <a:ea typeface="+mn-lt"/>
                 <a:cs typeface="+mn-lt"/>
               </a:rPr>
               <a:t>Jupyter</a:t>
             </a:r>
             <a:r>
-              <a:rPr lang="en-GB" dirty="0">
+              <a:rPr lang="en-GB" sz="2700" dirty="0">
                 <a:ea typeface="+mn-lt"/>
                 <a:cs typeface="+mn-lt"/>
               </a:rPr>
               <a:t> Notebook: </a:t>
             </a:r>
-            <a:endParaRPr lang="en-US" dirty="0"/>
-          </a:p>
-          <a:p>
-            <a:r>
-              <a:rPr lang="en-GB" dirty="0">
+            <a:endParaRPr lang="en-US" sz="2700">
+              <a:ea typeface="Calibri"/>
+              <a:cs typeface="Calibri"/>
+            </a:endParaRPr>
+          </a:p>
+          <a:p>
+            <a:r>
+              <a:rPr lang="en-GB" sz="2700" dirty="0">
                 <a:ea typeface="+mn-lt"/>
                 <a:cs typeface="+mn-lt"/>
               </a:rPr>
               <a:t>Linear regression: Baseline model assuming linear relationships. </a:t>
             </a:r>
-            <a:endParaRPr lang="en-GB" dirty="0"/>
-          </a:p>
-          <a:p>
-            <a:r>
-              <a:rPr lang="en-GB" dirty="0">
+            <a:endParaRPr lang="en-GB" sz="2700" dirty="0">
+              <a:ea typeface="Calibri"/>
+              <a:cs typeface="Calibri"/>
+            </a:endParaRPr>
+          </a:p>
+          <a:p>
+            <a:r>
+              <a:rPr lang="en-GB" sz="2700" dirty="0">
                 <a:ea typeface="+mn-lt"/>
                 <a:cs typeface="+mn-lt"/>
               </a:rPr>
               <a:t>Random forest: Ensemble model capturing non-linear patterns. </a:t>
             </a:r>
-            <a:endParaRPr lang="en-GB" dirty="0"/>
-          </a:p>
-          <a:p>
-            <a:r>
-              <a:rPr lang="en-GB" dirty="0">
+            <a:endParaRPr lang="en-GB" sz="2700" dirty="0">
+              <a:ea typeface="Calibri"/>
+              <a:cs typeface="Calibri"/>
+            </a:endParaRPr>
+          </a:p>
+          <a:p>
+            <a:r>
+              <a:rPr lang="en-GB" sz="2700" dirty="0">
                 <a:ea typeface="+mn-lt"/>
                 <a:cs typeface="+mn-lt"/>
               </a:rPr>
               <a:t>Gradient boosting: Advanced ensemble for complex relationships.</a:t>
             </a:r>
             <a:br>
-              <a:rPr lang="en-GB" dirty="0">
+              <a:rPr lang="en-GB" sz="2700" dirty="0">
                 <a:ea typeface="+mn-lt"/>
                 <a:cs typeface="+mn-lt"/>
               </a:rPr>
             </a:br>
-            <a:endParaRPr lang="en-GB" dirty="0">
+            <a:endParaRPr lang="en-GB" sz="2700" dirty="0">
               <a:ea typeface="+mn-lt"/>
               <a:cs typeface="+mn-lt"/>
             </a:endParaRPr>
           </a:p>
           <a:p>
             <a:r>
-              <a:rPr lang="en-GB" dirty="0">
+              <a:rPr lang="en-GB" sz="2700" dirty="0">
                 <a:ea typeface="+mn-lt"/>
                 <a:cs typeface="+mn-lt"/>
               </a:rPr>
               <a:t>Features Used: Country, Total spend, Recency, and </a:t>
             </a:r>
             <a:r>
-              <a:rPr lang="en-GB" dirty="0" err="1">
+              <a:rPr lang="en-GB" sz="2700" dirty="0" err="1">
                 <a:ea typeface="+mn-lt"/>
                 <a:cs typeface="+mn-lt"/>
               </a:rPr>
               <a:t>TopGenre</a:t>
             </a:r>
             <a:r>
-              <a:rPr lang="en-GB" dirty="0">
+              <a:rPr lang="en-GB" sz="2700" dirty="0">
                 <a:ea typeface="+mn-lt"/>
                 <a:cs typeface="+mn-lt"/>
               </a:rPr>
               <a:t>, </a:t>
             </a:r>
             <a:r>
-              <a:rPr lang="en-GB" dirty="0" err="1">
+              <a:rPr lang="en-GB" sz="2700" dirty="0" err="1">
                 <a:ea typeface="+mn-lt"/>
                 <a:cs typeface="+mn-lt"/>
               </a:rPr>
               <a:t>EmailDomain</a:t>
             </a:r>
             <a:r>
-              <a:rPr lang="en-GB" dirty="0">
+              <a:rPr lang="en-GB" sz="2700" dirty="0">
                 <a:ea typeface="+mn-lt"/>
                 <a:cs typeface="+mn-lt"/>
               </a:rPr>
               <a:t>, engineered from Chinook data.</a:t>
             </a:r>
             <a:br>
-              <a:rPr lang="en-GB" dirty="0">
+              <a:rPr lang="en-GB" sz="2700" dirty="0">
                 <a:ea typeface="+mn-lt"/>
                 <a:cs typeface="+mn-lt"/>
               </a:rPr>
             </a:br>
-            <a:endParaRPr lang="en-GB" dirty="0">
+            <a:endParaRPr lang="en-GB" sz="2700" dirty="0">
               <a:ea typeface="+mn-lt"/>
               <a:cs typeface="+mn-lt"/>
             </a:endParaRPr>
           </a:p>
           <a:p>
             <a:r>
-              <a:rPr lang="en-GB" dirty="0">
+              <a:rPr lang="en-GB" sz="2700" dirty="0">
                 <a:ea typeface="+mn-lt"/>
                 <a:cs typeface="+mn-lt"/>
               </a:rPr>
-              <a:t>Performance Results: Linear regression outperformed others with [Model Metric, e.g., R² =0.31], the only positive </a:t>
-            </a:r>
-            <a:r>
-              <a:rPr lang="en-GB" sz="3100" dirty="0">
-                <a:ea typeface="+mn-lt"/>
-                <a:cs typeface="+mn-lt"/>
-              </a:rPr>
-              <a:t>R² among the three models, </a:t>
-            </a:r>
-            <a:r>
-              <a:rPr lang="en-GB" dirty="0">
-                <a:ea typeface="+mn-lt"/>
-                <a:cs typeface="+mn-lt"/>
-              </a:rPr>
-              <a:t>indicating strong predictive accuracy for CLV.</a:t>
+              <a:t>Performance Results: Linear regression outperformed others with [Model Metric, e.g., R² =0.31], the only positive R² among the three models, indicating strong predictive accuracy for CLV.</a:t>
             </a:r>
             <a:br>
               <a:rPr lang="en-GB" dirty="0">
@@ -4511,10 +4454,15 @@
             <p:ph idx="1"/>
           </p:nvPr>
         </p:nvSpPr>
-        <p:spPr/>
+        <p:spPr>
+          <a:xfrm>
+            <a:off x="457200" y="1600200"/>
+            <a:ext cx="8229600" cy="4995194"/>
+          </a:xfrm>
+        </p:spPr>
         <p:txBody>
           <a:bodyPr vert="horz" lIns="91440" tIns="45720" rIns="91440" bIns="45720" rtlCol="0" anchor="t">
-            <a:normAutofit fontScale="70000" lnSpcReduction="20000"/>
+            <a:normAutofit fontScale="92500"/>
           </a:bodyPr>
           <a:lstStyle/>
           <a:p>
@@ -4526,62 +4474,72 @@
                 <a:ea typeface="+mn-lt"/>
                 <a:cs typeface="+mn-lt"/>
               </a:rPr>
-              <a:t>    • Analysis of the Chinook database uncovers actionable insights into customer behavior, sales trends, and market opportunities.</a:t>
-            </a:r>
-            <a:br>
-              <a:rPr lang="en-US" dirty="0">
+              <a:t>  </a:t>
+            </a:r>
+            <a:r>
+              <a:rPr lang="en-US" sz="2400" dirty="0">
                 <a:ea typeface="+mn-lt"/>
                 <a:cs typeface="+mn-lt"/>
               </a:rPr>
-            </a:br>
-            <a:r>
-              <a:rPr lang="en-US" dirty="0">
+              <a:t>  • Analysis of the Chinook database uncovers actionable insights into customer behavior, sales trends, and market opportunities.</a:t>
+            </a:r>
+            <a:br>
+              <a:rPr lang="en-US" sz="2400" dirty="0">
                 <a:ea typeface="+mn-lt"/>
                 <a:cs typeface="+mn-lt"/>
               </a:rPr>
-              <a:t>• The dominance of the Rock genre, coupled with the high lifetime value of Regular and Loyal customers, underscores their critical role in revenue growth.</a:t>
-            </a:r>
-            <a:br>
-              <a:rPr lang="en-US" dirty="0">
+            </a:br>
+            <a:r>
+              <a:rPr lang="en-US" sz="2400" dirty="0">
                 <a:ea typeface="+mn-lt"/>
                 <a:cs typeface="+mn-lt"/>
               </a:rPr>
-            </a:br>
-            <a:r>
-              <a:rPr lang="en-US" dirty="0">
+              <a:t>• The dominance of the Rock genre, coupled with the high lifetime value of Regular and Loyal customers, underscores their critical role in revenue growth.</a:t>
+            </a:r>
+            <a:br>
+              <a:rPr lang="en-US" sz="2400" dirty="0">
                 <a:ea typeface="+mn-lt"/>
                 <a:cs typeface="+mn-lt"/>
               </a:rPr>
-              <a:t>• Seasonal sales fluctuations highlight the need for strategic promotions, while top artists and album associations offer avenues for enhanced marketing.</a:t>
-            </a:r>
-            <a:br>
-              <a:rPr lang="en-US" dirty="0">
+            </a:br>
+            <a:r>
+              <a:rPr lang="en-US" sz="2400" dirty="0">
                 <a:ea typeface="+mn-lt"/>
                 <a:cs typeface="+mn-lt"/>
               </a:rPr>
-            </a:br>
-            <a:r>
-              <a:rPr lang="en-US" dirty="0">
+              <a:t>• Seasonal sales fluctuations highlight the need for strategic promotions, while top artists and album associations offer avenues for enhanced marketing.</a:t>
+            </a:r>
+            <a:br>
+              <a:rPr lang="en-US" sz="2400" dirty="0">
                 <a:ea typeface="+mn-lt"/>
                 <a:cs typeface="+mn-lt"/>
               </a:rPr>
+            </a:br>
+            <a:r>
+              <a:rPr lang="en-US" sz="2400" dirty="0">
+                <a:ea typeface="+mn-lt"/>
+                <a:cs typeface="+mn-lt"/>
+              </a:rPr>
               <a:t>• By leveraging these findings through targeted campaigns, optimized promotions, and data-driven bundling, the Chinook Media Store can strengthen customer loyalty, stabilize revenue, and drive sustainable growth.</a:t>
             </a:r>
-            <a:endParaRPr lang="en-US" dirty="0"/>
+            <a:endParaRPr lang="en-US" sz="2400">
+              <a:ea typeface="Calibri"/>
+              <a:cs typeface="Calibri"/>
+            </a:endParaRPr>
           </a:p>
           <a:p>
             <a:pPr>
               <a:buNone/>
             </a:pPr>
             <a:r>
-              <a:rPr lang="en-US" dirty="0">
+              <a:rPr lang="en-US" sz="2400" dirty="0">
                 <a:ea typeface="Calibri"/>
                 <a:cs typeface="Calibri"/>
               </a:rPr>
               <a:t> </a:t>
             </a:r>
             <a:r>
-              <a:rPr lang="en-US" dirty="0">
+              <a:rPr lang="en-US" sz="2400" dirty="0">
                 <a:ea typeface="+mn-lt"/>
                 <a:cs typeface="+mn-lt"/>
               </a:rPr>

</xml_diff>